<commit_message>
Added 1 page policy document
</commit_message>
<xml_diff>
--- a/Week4Presentation_CyberHygieneKPMG.pptx
+++ b/Week4Presentation_CyberHygieneKPMG.pptx
@@ -5,7 +5,7 @@
     <p:sldMasterId id="2147483660" r:id="rId4"/>
   </p:sldMasterIdLst>
   <p:notesMasterIdLst>
-    <p:notesMasterId r:id="rId11"/>
+    <p:notesMasterId r:id="rId12"/>
   </p:notesMasterIdLst>
   <p:sldIdLst>
     <p:sldId id="278" r:id="rId5"/>
@@ -14,6 +14,7 @@
     <p:sldId id="281" r:id="rId8"/>
     <p:sldId id="282" r:id="rId9"/>
     <p:sldId id="283" r:id="rId10"/>
+    <p:sldId id="284" r:id="rId11"/>
   </p:sldIdLst>
   <p:sldSz cx="12192000" cy="6858000"/>
   <p:notesSz cx="6858000" cy="9144000"/>
@@ -7058,7 +7059,7 @@
           </a:effectLst>
           <a:extLst>
             <a:ext uri="{91240B29-F687-4f45-9708-019B960494DF}">
-              <a14:hiddenLine xmlns:a16="http://schemas.microsoft.com/office/drawing/2014/main" xmlns:p14="http://schemas.microsoft.com/office/powerpoint/2010/main" xmlns:a14="http://schemas.microsoft.com/office/drawing/2010/main" xmlns="" w="9525">
+              <a14:hiddenLine xmlns="" xmlns:a14="http://schemas.microsoft.com/office/drawing/2010/main" xmlns:p14="http://schemas.microsoft.com/office/powerpoint/2010/main" xmlns:a16="http://schemas.microsoft.com/office/drawing/2014/main" w="9525">
                 <a:solidFill>
                   <a:srgbClr val="000000"/>
                 </a:solidFill>
@@ -8901,6 +8902,396 @@
     <p:extLst>
       <p:ext uri="{BB962C8B-B14F-4D97-AF65-F5344CB8AC3E}">
         <p14:creationId xmlns:p14="http://schemas.microsoft.com/office/powerpoint/2010/main" val="3924098014"/>
+      </p:ext>
+    </p:extLst>
+  </p:cSld>
+  <p:clrMapOvr>
+    <a:masterClrMapping/>
+  </p:clrMapOvr>
+</p:sld>
+</file>
+
+<file path=ppt/slides/slide7.xml><?xml version="1.0" encoding="utf-8"?>
+<p:sld xmlns:a="http://schemas.openxmlformats.org/drawingml/2006/main" xmlns:r="http://schemas.openxmlformats.org/officeDocument/2006/relationships" xmlns:p="http://schemas.openxmlformats.org/presentationml/2006/main">
+  <p:cSld>
+    <p:spTree>
+      <p:nvGrpSpPr>
+        <p:cNvPr id="1" name=""/>
+        <p:cNvGrpSpPr/>
+        <p:nvPr/>
+      </p:nvGrpSpPr>
+      <p:grpSpPr>
+        <a:xfrm>
+          <a:off x="0" y="0"/>
+          <a:ext cx="0" cy="0"/>
+          <a:chOff x="0" y="0"/>
+          <a:chExt cx="0" cy="0"/>
+        </a:xfrm>
+      </p:grpSpPr>
+      <p:sp>
+        <p:nvSpPr>
+          <p:cNvPr id="2" name="Title 1">
+            <a:extLst>
+              <a:ext uri="{FF2B5EF4-FFF2-40B4-BE49-F238E27FC236}">
+                <a16:creationId xmlns:a16="http://schemas.microsoft.com/office/drawing/2014/main" id="{897B226F-7E1F-CF2B-BA44-906DAF90D801}"/>
+              </a:ext>
+            </a:extLst>
+          </p:cNvPr>
+          <p:cNvSpPr>
+            <a:spLocks noGrp="1"/>
+          </p:cNvSpPr>
+          <p:nvPr>
+            <p:ph type="title"/>
+          </p:nvPr>
+        </p:nvSpPr>
+        <p:spPr>
+          <a:xfrm>
+            <a:off x="913795" y="609600"/>
+            <a:ext cx="10353762" cy="934720"/>
+          </a:xfrm>
+        </p:spPr>
+        <p:txBody>
+          <a:bodyPr>
+            <a:normAutofit fontScale="90000"/>
+          </a:bodyPr>
+          <a:lstStyle/>
+          <a:p>
+            <a:r>
+              <a:rPr lang="en-AU" sz="3200" b="1" dirty="0"/>
+              <a:t>KPMG Cyber Hygiene Policy Document</a:t>
+            </a:r>
+            <a:br>
+              <a:rPr lang="en-AU" sz="3200" b="1" dirty="0"/>
+            </a:br>
+            <a:r>
+              <a:rPr lang="en-AU" sz="3200" b="1" dirty="0"/>
+              <a:t> (Audit Personnel)</a:t>
+            </a:r>
+          </a:p>
+        </p:txBody>
+      </p:sp>
+      <p:sp>
+        <p:nvSpPr>
+          <p:cNvPr id="3" name="Title 1">
+            <a:extLst>
+              <a:ext uri="{FF2B5EF4-FFF2-40B4-BE49-F238E27FC236}">
+                <a16:creationId xmlns:a16="http://schemas.microsoft.com/office/drawing/2014/main" id="{210E36DE-6E75-5129-03BA-6B4C4A8AF1EF}"/>
+              </a:ext>
+            </a:extLst>
+          </p:cNvPr>
+          <p:cNvSpPr txBox="1">
+            <a:spLocks/>
+          </p:cNvSpPr>
+          <p:nvPr/>
+        </p:nvSpPr>
+        <p:spPr>
+          <a:xfrm>
+            <a:off x="690275" y="2171700"/>
+            <a:ext cx="10353762" cy="4503420"/>
+          </a:xfrm>
+          <a:prstGeom prst="rect">
+            <a:avLst/>
+          </a:prstGeom>
+          <a:effectLst>
+            <a:outerShdw blurRad="25400" dir="17880000">
+              <a:srgbClr val="000000">
+                <a:alpha val="46000"/>
+              </a:srgbClr>
+            </a:outerShdw>
+          </a:effectLst>
+        </p:spPr>
+        <p:txBody>
+          <a:bodyPr vert="horz" lIns="91440" tIns="45720" rIns="91440" bIns="45720" rtlCol="0" anchor="t">
+            <a:normAutofit fontScale="97500"/>
+          </a:bodyPr>
+          <a:lstStyle>
+            <a:lvl1pPr algn="ctr" defTabSz="457200" rtl="0" eaLnBrk="1" latinLnBrk="0" hangingPunct="1">
+              <a:lnSpc>
+                <a:spcPct val="90000"/>
+              </a:lnSpc>
+              <a:spcBef>
+                <a:spcPct val="0"/>
+              </a:spcBef>
+              <a:buNone/>
+              <a:defRPr sz="4600" kern="1200">
+                <a:ln>
+                  <a:solidFill>
+                    <a:schemeClr val="bg1">
+                      <a:lumMod val="75000"/>
+                      <a:lumOff val="25000"/>
+                      <a:alpha val="10000"/>
+                    </a:schemeClr>
+                  </a:solidFill>
+                </a:ln>
+                <a:solidFill>
+                  <a:schemeClr val="tx2"/>
+                </a:solidFill>
+                <a:effectLst>
+                  <a:outerShdw blurRad="9525" dist="25400" dir="14640000" algn="tl" rotWithShape="0">
+                    <a:schemeClr val="bg1">
+                      <a:alpha val="30000"/>
+                    </a:schemeClr>
+                  </a:outerShdw>
+                </a:effectLst>
+                <a:latin typeface="+mj-lt"/>
+                <a:ea typeface="+mj-ea"/>
+                <a:cs typeface="Trebuchet MS"/>
+              </a:defRPr>
+            </a:lvl1pPr>
+            <a:lvl2pPr eaLnBrk="1" hangingPunct="1">
+              <a:defRPr>
+                <a:solidFill>
+                  <a:schemeClr val="tx2"/>
+                </a:solidFill>
+              </a:defRPr>
+            </a:lvl2pPr>
+            <a:lvl3pPr eaLnBrk="1" hangingPunct="1">
+              <a:defRPr>
+                <a:solidFill>
+                  <a:schemeClr val="tx2"/>
+                </a:solidFill>
+              </a:defRPr>
+            </a:lvl3pPr>
+            <a:lvl4pPr eaLnBrk="1" hangingPunct="1">
+              <a:defRPr>
+                <a:solidFill>
+                  <a:schemeClr val="tx2"/>
+                </a:solidFill>
+              </a:defRPr>
+            </a:lvl4pPr>
+            <a:lvl5pPr eaLnBrk="1" hangingPunct="1">
+              <a:defRPr>
+                <a:solidFill>
+                  <a:schemeClr val="tx2"/>
+                </a:solidFill>
+              </a:defRPr>
+            </a:lvl5pPr>
+            <a:lvl6pPr eaLnBrk="1" hangingPunct="1">
+              <a:defRPr>
+                <a:solidFill>
+                  <a:schemeClr val="tx2"/>
+                </a:solidFill>
+              </a:defRPr>
+            </a:lvl6pPr>
+            <a:lvl7pPr eaLnBrk="1" hangingPunct="1">
+              <a:defRPr>
+                <a:solidFill>
+                  <a:schemeClr val="tx2"/>
+                </a:solidFill>
+              </a:defRPr>
+            </a:lvl7pPr>
+            <a:lvl8pPr eaLnBrk="1" hangingPunct="1">
+              <a:defRPr>
+                <a:solidFill>
+                  <a:schemeClr val="tx2"/>
+                </a:solidFill>
+              </a:defRPr>
+            </a:lvl8pPr>
+            <a:lvl9pPr eaLnBrk="1" hangingPunct="1">
+              <a:defRPr>
+                <a:solidFill>
+                  <a:schemeClr val="tx2"/>
+                </a:solidFill>
+              </a:defRPr>
+            </a:lvl9pPr>
+          </a:lstStyle>
+          <a:p>
+            <a:pPr algn="l"/>
+            <a:endParaRPr lang="en-AU" sz="1800" dirty="0"/>
+          </a:p>
+        </p:txBody>
+      </p:sp>
+      <p:sp>
+        <p:nvSpPr>
+          <p:cNvPr id="5" name="TextBox 4">
+            <a:extLst>
+              <a:ext uri="{FF2B5EF4-FFF2-40B4-BE49-F238E27FC236}">
+                <a16:creationId xmlns:a16="http://schemas.microsoft.com/office/drawing/2014/main" id="{83EA19F0-6681-79C4-0859-8661DFEDAAF0}"/>
+              </a:ext>
+            </a:extLst>
+          </p:cNvPr>
+          <p:cNvSpPr txBox="1"/>
+          <p:nvPr/>
+        </p:nvSpPr>
+        <p:spPr>
+          <a:xfrm>
+            <a:off x="406400" y="2171700"/>
+            <a:ext cx="11186160" cy="4431983"/>
+          </a:xfrm>
+          <a:prstGeom prst="rect">
+            <a:avLst/>
+          </a:prstGeom>
+          <a:noFill/>
+        </p:spPr>
+        <p:txBody>
+          <a:bodyPr wrap="square">
+            <a:spAutoFit/>
+          </a:bodyPr>
+          <a:lstStyle/>
+          <a:p>
+            <a:pPr marL="171450" indent="-171450">
+              <a:buFont typeface="Arial" panose="020B0604020202020204" pitchFamily="34" charset="0"/>
+              <a:buChar char="•"/>
+            </a:pPr>
+            <a:r>
+              <a:rPr lang="en-US" dirty="0"/>
+              <a:t>New company device issued regularly</a:t>
+            </a:r>
+          </a:p>
+          <a:p>
+            <a:pPr marL="171450" indent="-171450">
+              <a:buFont typeface="Arial" panose="020B0604020202020204" pitchFamily="34" charset="0"/>
+              <a:buChar char="•"/>
+            </a:pPr>
+            <a:r>
+              <a:rPr lang="en-US" dirty="0"/>
+              <a:t>Regular Antivirus software and library updates</a:t>
+            </a:r>
+          </a:p>
+          <a:p>
+            <a:pPr marL="171450" indent="-171450">
+              <a:buFont typeface="Arial" panose="020B0604020202020204" pitchFamily="34" charset="0"/>
+              <a:buChar char="•"/>
+            </a:pPr>
+            <a:r>
+              <a:rPr lang="en-US" dirty="0"/>
+              <a:t>Regular software updates for operating system and browsers</a:t>
+            </a:r>
+          </a:p>
+          <a:p>
+            <a:pPr marL="171450" indent="-171450">
+              <a:buFont typeface="Arial" panose="020B0604020202020204" pitchFamily="34" charset="0"/>
+              <a:buChar char="•"/>
+            </a:pPr>
+            <a:r>
+              <a:rPr lang="en-US" dirty="0"/>
+              <a:t>Only use the latest versions of all software products (incl. operating system, Microsoft Suite products, etc.)</a:t>
+            </a:r>
+          </a:p>
+          <a:p>
+            <a:pPr marL="171450" indent="-171450">
+              <a:buFont typeface="Arial" panose="020B0604020202020204" pitchFamily="34" charset="0"/>
+              <a:buChar char="•"/>
+            </a:pPr>
+            <a:r>
+              <a:rPr lang="en-US" dirty="0"/>
+              <a:t>Connection to the KPMG intranet only possible via VPN-client using company issued device</a:t>
+            </a:r>
+          </a:p>
+          <a:p>
+            <a:pPr marL="171450" indent="-171450">
+              <a:buFont typeface="Arial" panose="020B0604020202020204" pitchFamily="34" charset="0"/>
+              <a:buChar char="•"/>
+            </a:pPr>
+            <a:r>
+              <a:rPr lang="en-US" dirty="0"/>
+              <a:t>Regularly scheduled password changes mandated by the system</a:t>
+            </a:r>
+          </a:p>
+          <a:p>
+            <a:pPr marL="171450" indent="-171450">
+              <a:buFont typeface="Arial" panose="020B0604020202020204" pitchFamily="34" charset="0"/>
+              <a:buChar char="•"/>
+            </a:pPr>
+            <a:r>
+              <a:rPr lang="en-US" dirty="0"/>
+              <a:t>Mandatory 2FA on all devices </a:t>
+            </a:r>
+          </a:p>
+          <a:p>
+            <a:pPr marL="171450" indent="-171450">
+              <a:buFont typeface="Arial" panose="020B0604020202020204" pitchFamily="34" charset="0"/>
+              <a:buChar char="•"/>
+            </a:pPr>
+            <a:r>
+              <a:rPr lang="en-US" dirty="0"/>
+              <a:t>VPN connection timeout</a:t>
+            </a:r>
+          </a:p>
+          <a:p>
+            <a:pPr marL="171450" indent="-171450">
+              <a:buFont typeface="Arial" panose="020B0604020202020204" pitchFamily="34" charset="0"/>
+              <a:buChar char="•"/>
+            </a:pPr>
+            <a:r>
+              <a:rPr lang="en-US" dirty="0"/>
+              <a:t>Encryption needs to be used when sending files over the internet to 3</a:t>
+            </a:r>
+            <a:r>
+              <a:rPr lang="en-US" baseline="30000" dirty="0"/>
+              <a:t>rd</a:t>
+            </a:r>
+            <a:r>
+              <a:rPr lang="en-US" dirty="0"/>
+              <a:t> parties</a:t>
+            </a:r>
+          </a:p>
+          <a:p>
+            <a:pPr marL="171450" indent="-171450">
+              <a:buFont typeface="Arial" panose="020B0604020202020204" pitchFamily="34" charset="0"/>
+              <a:buChar char="•"/>
+            </a:pPr>
+            <a:r>
+              <a:rPr lang="en-US" dirty="0"/>
+              <a:t>Mandatory interactive online training courses</a:t>
+            </a:r>
+          </a:p>
+          <a:p>
+            <a:pPr marL="171450" indent="-171450">
+              <a:buFont typeface="Arial" panose="020B0604020202020204" pitchFamily="34" charset="0"/>
+              <a:buChar char="•"/>
+            </a:pPr>
+            <a:r>
+              <a:rPr lang="en-US" dirty="0"/>
+              <a:t>Regular mandatory assessments on  cyber hygiene</a:t>
+            </a:r>
+          </a:p>
+          <a:p>
+            <a:pPr marL="171450" indent="-171450">
+              <a:buFont typeface="Arial" panose="020B0604020202020204" pitchFamily="34" charset="0"/>
+              <a:buChar char="•"/>
+            </a:pPr>
+            <a:r>
+              <a:rPr lang="en-US" dirty="0"/>
+              <a:t>Regular probing by the security admin via simulated phishing attacks</a:t>
+            </a:r>
+          </a:p>
+          <a:p>
+            <a:pPr marL="171450" indent="-171450">
+              <a:buFont typeface="Arial" panose="020B0604020202020204" pitchFamily="34" charset="0"/>
+              <a:buChar char="•"/>
+            </a:pPr>
+            <a:r>
+              <a:rPr lang="en-US" dirty="0"/>
+              <a:t>Regular automatic backup of company device HDD/SSD on company cloud solution</a:t>
+            </a:r>
+          </a:p>
+          <a:p>
+            <a:pPr marL="171450" indent="-171450">
+              <a:buFont typeface="Arial" panose="020B0604020202020204" pitchFamily="34" charset="0"/>
+              <a:buChar char="•"/>
+            </a:pPr>
+            <a:r>
+              <a:rPr lang="en-US" dirty="0"/>
+              <a:t>Important documents to be backed up on the company cloud solution</a:t>
+            </a:r>
+          </a:p>
+          <a:p>
+            <a:endParaRPr lang="en-US" sz="1200" dirty="0"/>
+          </a:p>
+          <a:p>
+            <a:pPr marL="285750" indent="-285750">
+              <a:buFont typeface="Arial" panose="020B0604020202020204" pitchFamily="34" charset="0"/>
+              <a:buChar char="•"/>
+            </a:pPr>
+            <a:endParaRPr lang="en-AU" dirty="0"/>
+          </a:p>
+        </p:txBody>
+      </p:sp>
+    </p:spTree>
+    <p:extLst>
+      <p:ext uri="{BB962C8B-B14F-4D97-AF65-F5344CB8AC3E}">
+        <p14:creationId xmlns:p14="http://schemas.microsoft.com/office/powerpoint/2010/main" val="1729160462"/>
       </p:ext>
     </p:extLst>
   </p:cSld>
@@ -9646,12 +10037,12 @@
 </file>
 
 <file path=customXml/item1.xml><?xml version="1.0" encoding="utf-8"?>
-<p:properties xmlns:p="http://schemas.microsoft.com/office/2006/metadata/properties" xmlns:xsi="http://www.w3.org/2001/XMLSchema-instance" xmlns:pc="http://schemas.microsoft.com/office/infopath/2007/PartnerControls">
-  <documentManagement>
-    <Status xmlns="71af3243-3dd4-4a8d-8c0d-dd76da1f02a5">Not started</Status>
-    <MediaServiceKeyPoints xmlns="71af3243-3dd4-4a8d-8c0d-dd76da1f02a5" xsi:nil="true"/>
-  </documentManagement>
-</p:properties>
+<?mso-contentType ?>
+<FormTemplates xmlns="http://schemas.microsoft.com/sharepoint/v3/contenttype/forms">
+  <Display>DocumentLibraryForm</Display>
+  <Edit>DocumentLibraryForm</Edit>
+  <New>DocumentLibraryForm</New>
+</FormTemplates>
 </file>
 
 <file path=customXml/item2.xml><?xml version="1.0" encoding="utf-8"?>
@@ -9876,20 +10267,18 @@
 </file>
 
 <file path=customXml/item3.xml><?xml version="1.0" encoding="utf-8"?>
-<?mso-contentType ?>
-<FormTemplates xmlns="http://schemas.microsoft.com/sharepoint/v3/contenttype/forms">
-  <Display>DocumentLibraryForm</Display>
-  <Edit>DocumentLibraryForm</Edit>
-  <New>DocumentLibraryForm</New>
-</FormTemplates>
+<p:properties xmlns:p="http://schemas.microsoft.com/office/2006/metadata/properties" xmlns:xsi="http://www.w3.org/2001/XMLSchema-instance" xmlns:pc="http://schemas.microsoft.com/office/infopath/2007/PartnerControls">
+  <documentManagement>
+    <Status xmlns="71af3243-3dd4-4a8d-8c0d-dd76da1f02a5">Not started</Status>
+    <MediaServiceKeyPoints xmlns="71af3243-3dd4-4a8d-8c0d-dd76da1f02a5" xsi:nil="true"/>
+  </documentManagement>
+</p:properties>
 </file>
 
 <file path=customXml/itemProps1.xml><?xml version="1.0" encoding="utf-8"?>
-<ds:datastoreItem xmlns:ds="http://schemas.openxmlformats.org/officeDocument/2006/customXml" ds:itemID="{2C4C00F4-06E9-43E3-AD97-88A857CEFA82}">
+<ds:datastoreItem xmlns:ds="http://schemas.openxmlformats.org/officeDocument/2006/customXml" ds:itemID="{64B270AB-C138-415C-897E-3C24487DECF1}">
   <ds:schemaRefs>
-    <ds:schemaRef ds:uri="http://schemas.microsoft.com/office/2006/metadata/properties"/>
-    <ds:schemaRef ds:uri="http://schemas.microsoft.com/office/infopath/2007/PartnerControls"/>
-    <ds:schemaRef ds:uri="71af3243-3dd4-4a8d-8c0d-dd76da1f02a5"/>
+    <ds:schemaRef ds:uri="http://schemas.microsoft.com/sharepoint/v3/contenttype/forms"/>
   </ds:schemaRefs>
 </ds:datastoreItem>
 </file>
@@ -9914,9 +10303,11 @@
 </file>
 
 <file path=customXml/itemProps3.xml><?xml version="1.0" encoding="utf-8"?>
-<ds:datastoreItem xmlns:ds="http://schemas.openxmlformats.org/officeDocument/2006/customXml" ds:itemID="{64B270AB-C138-415C-897E-3C24487DECF1}">
+<ds:datastoreItem xmlns:ds="http://schemas.openxmlformats.org/officeDocument/2006/customXml" ds:itemID="{2C4C00F4-06E9-43E3-AD97-88A857CEFA82}">
   <ds:schemaRefs>
-    <ds:schemaRef ds:uri="http://schemas.microsoft.com/sharepoint/v3/contenttype/forms"/>
+    <ds:schemaRef ds:uri="http://schemas.microsoft.com/office/2006/metadata/properties"/>
+    <ds:schemaRef ds:uri="http://schemas.microsoft.com/office/infopath/2007/PartnerControls"/>
+    <ds:schemaRef ds:uri="71af3243-3dd4-4a8d-8c0d-dd76da1f02a5"/>
   </ds:schemaRefs>
 </ds:datastoreItem>
 </file>
</xml_diff>